<commit_message>
Update slide on papers, include PTO UI
</commit_message>
<xml_diff>
--- a/review1/WP4-ReviewM6.pptx
+++ b/review1/WP4-ReviewM6.pptx
@@ -5,10 +5,10 @@
     <p:sldMasterId id="2147483648" r:id="rId1"/>
   </p:sldMasterIdLst>
   <p:notesMasterIdLst>
-    <p:notesMasterId r:id="rId22"/>
+    <p:notesMasterId r:id="rId23"/>
   </p:notesMasterIdLst>
   <p:handoutMasterIdLst>
-    <p:handoutMasterId r:id="rId23"/>
+    <p:handoutMasterId r:id="rId24"/>
   </p:handoutMasterIdLst>
   <p:sldIdLst>
     <p:sldId id="274" r:id="rId2"/>
@@ -31,6 +31,7 @@
     <p:sldId id="294" r:id="rId19"/>
     <p:sldId id="295" r:id="rId20"/>
     <p:sldId id="279" r:id="rId21"/>
+    <p:sldId id="296" r:id="rId22"/>
   </p:sldIdLst>
   <p:sldSz cx="13004800" cy="9753600"/>
   <p:notesSz cx="6858000" cy="9144000"/>
@@ -277,7 +278,7 @@
           <a:p>
             <a:fld id="{38AEA946-BE12-485E-8CED-EB49F79C0D9F}" type="datetimeFigureOut">
               <a:rPr lang="de-CH" smtClean="0"/>
-              <a:t>18.10.2016</a:t>
+              <a:t>19.10.16</a:t>
             </a:fld>
             <a:endParaRPr lang="de-CH"/>
           </a:p>
@@ -343,7 +344,7 @@
           <a:p>
             <a:fld id="{AB7FCD5B-4957-4027-8017-EFFEE2DC5C01}" type="slidenum">
               <a:rPr lang="de-CH" smtClean="0"/>
-              <a:t>‹Nr.›</a:t>
+              <a:t>‹#›</a:t>
             </a:fld>
             <a:endParaRPr lang="de-CH"/>
           </a:p>
@@ -1453,7 +1454,7 @@
             <a:fld id="{CA36C8A0-BAEB-42C3-A2D9-B1F0D6FD294D}" type="slidenum">
               <a:rPr lang="de-CH" smtClean="0"/>
               <a:pPr/>
-              <a:t>‹Nr.›</a:t>
+              <a:t>‹#›</a:t>
             </a:fld>
             <a:endParaRPr lang="de-CH" dirty="0" smtClean="0"/>
           </a:p>
@@ -2691,7 +2692,7 @@
             <a:fld id="{CA36C8A0-BAEB-42C3-A2D9-B1F0D6FD294D}" type="slidenum">
               <a:rPr lang="de-CH" smtClean="0"/>
               <a:pPr/>
-              <a:t>‹Nr.›</a:t>
+              <a:t>‹#›</a:t>
             </a:fld>
             <a:endParaRPr lang="de-CH" dirty="0" smtClean="0"/>
           </a:p>
@@ -3128,7 +3129,7 @@
             <a:fld id="{CA36C8A0-BAEB-42C3-A2D9-B1F0D6FD294D}" type="slidenum">
               <a:rPr lang="de-CH" smtClean="0"/>
               <a:pPr/>
-              <a:t>‹Nr.›</a:t>
+              <a:t>‹#›</a:t>
             </a:fld>
             <a:endParaRPr lang="de-CH" dirty="0" smtClean="0"/>
           </a:p>
@@ -3565,7 +3566,7 @@
             <a:fld id="{CA36C8A0-BAEB-42C3-A2D9-B1F0D6FD294D}" type="slidenum">
               <a:rPr lang="de-CH" smtClean="0"/>
               <a:pPr/>
-              <a:t>‹Nr.›</a:t>
+              <a:t>‹#›</a:t>
             </a:fld>
             <a:endParaRPr lang="de-CH" dirty="0" smtClean="0"/>
           </a:p>
@@ -5226,7 +5227,7 @@
           </a:ln>
           <a:extLst>
             <a:ext uri="{C572A759-6A51-4108-AA02-DFA0A04FC94B}">
-              <ma14:wrappingTextBoxFlag xmlns:ma14="http://schemas.microsoft.com/office/mac/drawingml/2011/main" xmlns="" val="1"/>
+              <ma14:wrappingTextBoxFlag xmlns:ma14="http://schemas.microsoft.com/office/mac/drawingml/2011/main" val="1"/>
             </a:ext>
           </a:extLst>
         </p:spPr>
@@ -5348,7 +5349,7 @@
             <a:fld id="{CA36C8A0-BAEB-42C3-A2D9-B1F0D6FD294D}" type="slidenum">
               <a:rPr lang="de-CH" smtClean="0"/>
               <a:pPr/>
-              <a:t>‹Nr.›</a:t>
+              <a:t>‹#›</a:t>
             </a:fld>
             <a:endParaRPr lang="de-CH" dirty="0" smtClean="0"/>
           </a:p>
@@ -6699,7 +6700,7 @@
         <p:spPr/>
         <p:txBody>
           <a:bodyPr>
-            <a:normAutofit/>
+            <a:normAutofit fontScale="85000" lnSpcReduction="20000"/>
           </a:bodyPr>
           <a:lstStyle/>
           <a:p>
@@ -6732,21 +6733,22 @@
             <a:pPr lvl="1"/>
             <a:r>
               <a:rPr lang="en-US" dirty="0" smtClean="0"/>
-              <a:t>1 full and 2 short papers</a:t>
-            </a:r>
-          </a:p>
-          <a:p>
+              <a:t>1 full and 2 short </a:t>
+            </a:r>
             <a:r>
               <a:rPr lang="en-US" dirty="0" smtClean="0"/>
-              <a:t>ACM </a:t>
-            </a:r>
+              <a:t>papers</a:t>
+            </a:r>
+            <a:endParaRPr lang="en-US" dirty="0" smtClean="0"/>
+          </a:p>
+          <a:p>
             <a:r>
               <a:rPr lang="en-US" dirty="0" err="1" smtClean="0"/>
-              <a:t>Sigcomm</a:t>
-            </a:r>
-            <a:r>
-              <a:rPr lang="en-US" dirty="0"/>
-              <a:t> Computer Communication Review</a:t>
+              <a:t>CoNEXT</a:t>
+            </a:r>
+            <a:r>
+              <a:rPr lang="en-US" dirty="0" smtClean="0"/>
+              <a:t> 2016</a:t>
             </a:r>
           </a:p>
           <a:p>
@@ -6755,63 +6757,113 @@
               <a:rPr lang="en-US" dirty="0">
                 <a:hlinkClick r:id="rId3"/>
               </a:rPr>
-              <a:t>http://</a:t>
+              <a:t>http://conferences2.sigcomm.org/co-next/2016</a:t>
             </a:r>
             <a:r>
               <a:rPr lang="en-US" dirty="0" smtClean="0">
                 <a:hlinkClick r:id="rId3"/>
               </a:rPr>
-              <a:t>www.sigcomm.org/publications/computer-communication-review</a:t>
-            </a:r>
+              <a:t>/</a:t>
+            </a:r>
+            <a:endParaRPr lang="en-US" dirty="0"/>
+          </a:p>
+          <a:p>
+            <a:pPr lvl="1"/>
             <a:r>
               <a:rPr lang="en-US" dirty="0" smtClean="0"/>
-              <a:t> </a:t>
+              <a:t>1 full paper</a:t>
+            </a:r>
+          </a:p>
+          <a:p>
+            <a:r>
+              <a:rPr lang="en-US" dirty="0" smtClean="0"/>
+              <a:t>Submissions</a:t>
             </a:r>
           </a:p>
           <a:p>
             <a:pPr lvl="1"/>
             <a:r>
               <a:rPr lang="en-US" dirty="0" smtClean="0"/>
-              <a:t>1 </a:t>
+              <a:t>ACM </a:t>
+            </a:r>
+            <a:r>
+              <a:rPr lang="en-US" dirty="0" err="1" smtClean="0"/>
+              <a:t>Sigcomm</a:t>
             </a:r>
             <a:r>
               <a:rPr lang="en-US" dirty="0"/>
-              <a:t>technical paper with repeatable </a:t>
+              <a:t> Computer Communication </a:t>
             </a:r>
             <a:r>
               <a:rPr lang="en-US" dirty="0" smtClean="0"/>
-              <a:t>results, 1 </a:t>
-            </a:r>
-            <a:r>
-              <a:rPr lang="en-US" dirty="0"/>
-              <a:t>technical paper</a:t>
-            </a:r>
-            <a:endParaRPr lang="en-US" dirty="0" smtClean="0"/>
-          </a:p>
-          <a:p>
-            <a:r>
-              <a:rPr lang="en-US" dirty="0" smtClean="0"/>
-              <a:t>Passive and Active Measurement</a:t>
-            </a:r>
-          </a:p>
-          <a:p>
-            <a:pPr lvl="1"/>
+              <a:t>Review </a:t>
+            </a:r>
+            <a:endParaRPr lang="en-US" dirty="0"/>
+          </a:p>
+          <a:p>
+            <a:pPr lvl="2"/>
             <a:r>
               <a:rPr lang="en-US" dirty="0">
                 <a:hlinkClick r:id="rId4"/>
               </a:rPr>
-              <a:t>https://research.csiro.au/pam2017</a:t>
+              <a:t>http://</a:t>
             </a:r>
             <a:r>
               <a:rPr lang="en-US" dirty="0" smtClean="0">
                 <a:hlinkClick r:id="rId4"/>
               </a:rPr>
+              <a:t>www.sigcomm.org/publications/computer-communication-review</a:t>
+            </a:r>
+            <a:r>
+              <a:rPr lang="en-US" dirty="0" smtClean="0"/>
+              <a:t> </a:t>
+            </a:r>
+          </a:p>
+          <a:p>
+            <a:pPr lvl="2"/>
+            <a:r>
+              <a:rPr lang="en-US" dirty="0" smtClean="0"/>
+              <a:t>1 </a:t>
+            </a:r>
+            <a:r>
+              <a:rPr lang="en-US" dirty="0"/>
+              <a:t>technical paper with repeatable </a:t>
+            </a:r>
+            <a:r>
+              <a:rPr lang="en-US" dirty="0" smtClean="0"/>
+              <a:t>results, 1 </a:t>
+            </a:r>
+            <a:r>
+              <a:rPr lang="en-US" dirty="0"/>
+              <a:t>technical paper</a:t>
+            </a:r>
+            <a:endParaRPr lang="en-US" dirty="0" smtClean="0"/>
+          </a:p>
+          <a:p>
+            <a:pPr lvl="1"/>
+            <a:r>
+              <a:rPr lang="en-US" dirty="0" smtClean="0"/>
+              <a:t>Passive and Active Measurement</a:t>
+            </a:r>
+          </a:p>
+          <a:p>
+            <a:pPr lvl="2"/>
+            <a:r>
+              <a:rPr lang="en-US" dirty="0">
+                <a:hlinkClick r:id="rId5"/>
+              </a:rPr>
+              <a:t>https://research.csiro.au/pam2017</a:t>
+            </a:r>
+            <a:r>
+              <a:rPr lang="en-US" dirty="0" smtClean="0">
+                <a:hlinkClick r:id="rId5"/>
+              </a:rPr>
               <a:t>/</a:t>
             </a:r>
             <a:endParaRPr lang="en-US" dirty="0" smtClean="0"/>
           </a:p>
           <a:p>
-            <a:pPr lvl="1"/>
+            <a:pPr lvl="2"/>
             <a:r>
               <a:rPr lang="en-US" dirty="0" smtClean="0"/>
               <a:t>1 full paper</a:t>
@@ -8709,6 +8761,34 @@
           </a:p>
         </p:txBody>
       </p:sp>
+      <p:sp>
+        <p:nvSpPr>
+          <p:cNvPr id="7" name="Slide Number Placeholder 3"/>
+          <p:cNvSpPr>
+            <a:spLocks noGrp="1"/>
+          </p:cNvSpPr>
+          <p:nvPr>
+            <p:ph type="sldNum" sz="quarter" idx="16"/>
+          </p:nvPr>
+        </p:nvSpPr>
+        <p:spPr>
+          <a:xfrm>
+            <a:off x="11774329" y="9125206"/>
+            <a:ext cx="720000" cy="360000"/>
+          </a:xfrm>
+        </p:spPr>
+        <p:txBody>
+          <a:bodyPr/>
+          <a:lstStyle/>
+          <a:p>
+            <a:r>
+              <a:rPr lang="de-CH" dirty="0"/>
+              <a:t>2</a:t>
+            </a:r>
+            <a:endParaRPr lang="de-CH" dirty="0" smtClean="0"/>
+          </a:p>
+        </p:txBody>
+      </p:sp>
     </p:spTree>
     <p:extLst>
       <p:ext uri="{BB962C8B-B14F-4D97-AF65-F5344CB8AC3E}">
@@ -8981,6 +9061,572 @@
     <p:extLst>
       <p:ext uri="{BB962C8B-B14F-4D97-AF65-F5344CB8AC3E}">
         <p14:creationId xmlns:p14="http://schemas.microsoft.com/office/powerpoint/2010/main" val="1672072595"/>
+      </p:ext>
+    </p:extLst>
+  </p:cSld>
+  <p:clrMapOvr>
+    <a:masterClrMapping/>
+  </p:clrMapOvr>
+  <p:transition spd="med"/>
+  <p:timing>
+    <p:tnLst>
+      <p:par>
+        <p:cTn id="1" dur="indefinite" restart="never" nodeType="tmRoot"/>
+      </p:par>
+    </p:tnLst>
+  </p:timing>
+</p:sld>
+</file>
+
+<file path=ppt/slides/slide21.xml><?xml version="1.0" encoding="utf-8"?>
+<p:sld xmlns:a="http://schemas.openxmlformats.org/drawingml/2006/main" xmlns:r="http://schemas.openxmlformats.org/officeDocument/2006/relationships" xmlns:p="http://schemas.openxmlformats.org/presentationml/2006/main">
+  <p:cSld>
+    <p:spTree>
+      <p:nvGrpSpPr>
+        <p:cNvPr id="1" name=""/>
+        <p:cNvGrpSpPr/>
+        <p:nvPr/>
+      </p:nvGrpSpPr>
+      <p:grpSpPr>
+        <a:xfrm>
+          <a:off x="0" y="0"/>
+          <a:ext cx="0" cy="0"/>
+          <a:chOff x="0" y="0"/>
+          <a:chExt cx="0" cy="0"/>
+        </a:xfrm>
+      </p:grpSpPr>
+      <p:sp>
+        <p:nvSpPr>
+          <p:cNvPr id="2" name="Title 1"/>
+          <p:cNvSpPr>
+            <a:spLocks noGrp="1"/>
+          </p:cNvSpPr>
+          <p:nvPr>
+            <p:ph type="title"/>
+          </p:nvPr>
+        </p:nvSpPr>
+        <p:spPr/>
+        <p:txBody>
+          <a:bodyPr/>
+          <a:lstStyle/>
+          <a:p>
+            <a:r>
+              <a:rPr lang="en-US" dirty="0" smtClean="0"/>
+              <a:t>T4.6 – PTO UI Design </a:t>
+            </a:r>
+            <a:br>
+              <a:rPr lang="en-US" dirty="0" smtClean="0"/>
+            </a:br>
+            <a:r>
+              <a:rPr lang="en-US" sz="2800" u="sng" dirty="0">
+                <a:hlinkClick r:id="rId2"/>
+              </a:rPr>
+              <a:t>https://observatory.mami-project.eu/#/</a:t>
+            </a:r>
+            <a:r>
+              <a:rPr lang="en-US" sz="2800" u="sng" dirty="0" smtClean="0">
+                <a:hlinkClick r:id="rId2"/>
+              </a:rPr>
+              <a:t>observatory</a:t>
+            </a:r>
+            <a:endParaRPr lang="en-US" sz="2800" dirty="0"/>
+          </a:p>
+        </p:txBody>
+      </p:sp>
+      <p:sp>
+        <p:nvSpPr>
+          <p:cNvPr id="3" name="Text Placeholder 2"/>
+          <p:cNvSpPr>
+            <a:spLocks noGrp="1"/>
+          </p:cNvSpPr>
+          <p:nvPr>
+            <p:ph type="body" sz="quarter" idx="13"/>
+          </p:nvPr>
+        </p:nvSpPr>
+        <p:spPr>
+          <a:xfrm>
+            <a:off x="309713" y="2750973"/>
+            <a:ext cx="5249725" cy="3205947"/>
+          </a:xfrm>
+        </p:spPr>
+        <p:txBody>
+          <a:bodyPr>
+            <a:normAutofit/>
+          </a:bodyPr>
+          <a:lstStyle/>
+          <a:p>
+            <a:pPr marL="514350" indent="-514350">
+              <a:buSzPct val="100000"/>
+              <a:buFont typeface="+mj-lt"/>
+              <a:buAutoNum type="arabicParenR"/>
+            </a:pPr>
+            <a:r>
+              <a:rPr lang="en-US" sz="2600" dirty="0"/>
+              <a:t>User selects </a:t>
+            </a:r>
+            <a:r>
+              <a:rPr lang="en-US" sz="2600" dirty="0" smtClean="0"/>
+              <a:t>criteria: {</a:t>
+            </a:r>
+            <a:r>
+              <a:rPr lang="en-US" sz="2600" dirty="0" err="1" smtClean="0"/>
+              <a:t>t,p,c</a:t>
+            </a:r>
+            <a:r>
+              <a:rPr lang="en-US" sz="2600" dirty="0" smtClean="0"/>
+              <a:t>}</a:t>
+            </a:r>
+            <a:endParaRPr lang="en-US" sz="2600" dirty="0"/>
+          </a:p>
+          <a:p>
+            <a:pPr marL="514350" indent="-514350">
+              <a:buSzPct val="100000"/>
+              <a:buFont typeface="+mj-lt"/>
+              <a:buAutoNum type="arabicParenR"/>
+            </a:pPr>
+            <a:r>
+              <a:rPr lang="en-US" sz="2600" dirty="0"/>
+              <a:t>Q</a:t>
+            </a:r>
+            <a:r>
+              <a:rPr lang="en-US" sz="2600" dirty="0" smtClean="0"/>
+              <a:t>uery is submitted to </a:t>
+            </a:r>
+            <a:r>
+              <a:rPr lang="en-US" sz="2600" dirty="0"/>
+              <a:t>PTO</a:t>
+            </a:r>
+          </a:p>
+          <a:p>
+            <a:pPr marL="514350" indent="-514350">
+              <a:buSzPct val="100000"/>
+              <a:buFont typeface="+mj-lt"/>
+              <a:buAutoNum type="arabicParenR"/>
+            </a:pPr>
+            <a:r>
+              <a:rPr lang="en-US" sz="2600" dirty="0"/>
+              <a:t>PTO queries </a:t>
+            </a:r>
+            <a:r>
+              <a:rPr lang="en-US" sz="2600" dirty="0" smtClean="0"/>
+              <a:t>database</a:t>
+            </a:r>
+            <a:endParaRPr lang="en-US" sz="2600" dirty="0"/>
+          </a:p>
+          <a:p>
+            <a:pPr marL="514350" indent="-514350">
+              <a:buSzPct val="100000"/>
+              <a:buFont typeface="+mj-lt"/>
+              <a:buAutoNum type="arabicParenR"/>
+            </a:pPr>
+            <a:r>
+              <a:rPr lang="en-US" sz="2600" dirty="0"/>
+              <a:t>PTO returns JSON to PTO UI</a:t>
+            </a:r>
+          </a:p>
+          <a:p>
+            <a:pPr marL="514350" indent="-514350">
+              <a:buSzPct val="100000"/>
+              <a:buFont typeface="+mj-lt"/>
+              <a:buAutoNum type="arabicParenR"/>
+            </a:pPr>
+            <a:r>
+              <a:rPr lang="en-US" sz="2600" dirty="0"/>
+              <a:t>PTO UI renders </a:t>
+            </a:r>
+            <a:r>
+              <a:rPr lang="en-US" sz="2600" dirty="0" smtClean="0"/>
+              <a:t>JSON</a:t>
+            </a:r>
+          </a:p>
+        </p:txBody>
+      </p:sp>
+      <p:sp>
+        <p:nvSpPr>
+          <p:cNvPr id="4" name="Slide Number Placeholder 3"/>
+          <p:cNvSpPr>
+            <a:spLocks noGrp="1"/>
+          </p:cNvSpPr>
+          <p:nvPr>
+            <p:ph type="sldNum" sz="quarter" idx="16"/>
+          </p:nvPr>
+        </p:nvSpPr>
+        <p:spPr/>
+        <p:txBody>
+          <a:bodyPr/>
+          <a:lstStyle/>
+          <a:p>
+            <a:fld id="{CA36C8A0-BAEB-42C3-A2D9-B1F0D6FD294D}" type="slidenum">
+              <a:rPr lang="de-CH" smtClean="0"/>
+              <a:pPr/>
+              <a:t>21</a:t>
+            </a:fld>
+            <a:endParaRPr lang="de-CH" dirty="0" smtClean="0"/>
+          </a:p>
+        </p:txBody>
+      </p:sp>
+      <p:sp>
+        <p:nvSpPr>
+          <p:cNvPr id="5" name="Date Placeholder 4"/>
+          <p:cNvSpPr>
+            <a:spLocks noGrp="1"/>
+          </p:cNvSpPr>
+          <p:nvPr>
+            <p:ph type="dt" sz="half" idx="14"/>
+          </p:nvPr>
+        </p:nvSpPr>
+        <p:spPr/>
+        <p:txBody>
+          <a:bodyPr/>
+          <a:lstStyle/>
+          <a:p>
+            <a:r>
+              <a:rPr lang="de-DE" smtClean="0"/>
+              <a:t>29.01.2016</a:t>
+            </a:r>
+            <a:endParaRPr lang="en-US" dirty="0"/>
+          </a:p>
+        </p:txBody>
+      </p:sp>
+      <p:pic>
+        <p:nvPicPr>
+          <p:cNvPr id="6" name="Picture 5"/>
+          <p:cNvPicPr>
+            <a:picLocks noChangeAspect="1"/>
+          </p:cNvPicPr>
+          <p:nvPr/>
+        </p:nvPicPr>
+        <p:blipFill>
+          <a:blip r:embed="rId3"/>
+          <a:stretch>
+            <a:fillRect/>
+          </a:stretch>
+        </p:blipFill>
+        <p:spPr>
+          <a:xfrm>
+            <a:off x="5710312" y="2750973"/>
+            <a:ext cx="7011849" cy="3999006"/>
+          </a:xfrm>
+          <a:prstGeom prst="rect">
+            <a:avLst/>
+          </a:prstGeom>
+        </p:spPr>
+      </p:pic>
+      <p:sp>
+        <p:nvSpPr>
+          <p:cNvPr id="7" name="Text Placeholder 2"/>
+          <p:cNvSpPr txBox="1">
+            <a:spLocks/>
+          </p:cNvSpPr>
+          <p:nvPr/>
+        </p:nvSpPr>
+        <p:spPr>
+          <a:xfrm>
+            <a:off x="309712" y="7235758"/>
+            <a:ext cx="6545869" cy="1648846"/>
+          </a:xfrm>
+          <a:prstGeom prst="rect">
+            <a:avLst/>
+          </a:prstGeom>
+        </p:spPr>
+        <p:txBody>
+          <a:bodyPr vert="horz" lIns="91440" tIns="45720" rIns="91440" bIns="45720" rtlCol="0">
+            <a:noAutofit/>
+          </a:bodyPr>
+          <a:lstStyle>
+            <a:lvl1pPr marL="361950" indent="-361950" defTabSz="361950" eaLnBrk="1" hangingPunct="1">
+              <a:lnSpc>
+                <a:spcPct val="120000"/>
+              </a:lnSpc>
+              <a:spcBef>
+                <a:spcPts val="700"/>
+              </a:spcBef>
+              <a:buClr>
+                <a:schemeClr val="tx1"/>
+              </a:buClr>
+              <a:buSzPct val="130000"/>
+              <a:buFontTx/>
+              <a:buChar char="•"/>
+              <a:defRPr sz="3200">
+                <a:uFill>
+                  <a:solidFill/>
+                </a:uFill>
+                <a:latin typeface="+mn-lt"/>
+                <a:ea typeface="+mn-ea"/>
+                <a:cs typeface="+mn-cs"/>
+                <a:sym typeface="Helvetica Neue"/>
+              </a:defRPr>
+            </a:lvl1pPr>
+            <a:lvl2pPr marL="803275" indent="-352425" defTabSz="361950" eaLnBrk="1" hangingPunct="1">
+              <a:lnSpc>
+                <a:spcPct val="120000"/>
+              </a:lnSpc>
+              <a:spcBef>
+                <a:spcPts val="700"/>
+              </a:spcBef>
+              <a:buClr>
+                <a:schemeClr val="tx1"/>
+              </a:buClr>
+              <a:buSzPct val="130000"/>
+              <a:buFontTx/>
+              <a:buChar char="•"/>
+              <a:defRPr sz="2800">
+                <a:uFill>
+                  <a:solidFill/>
+                </a:uFill>
+                <a:latin typeface="+mn-lt"/>
+                <a:ea typeface="+mn-ea"/>
+                <a:cs typeface="+mn-cs"/>
+                <a:sym typeface="Helvetica Neue"/>
+              </a:defRPr>
+            </a:lvl2pPr>
+            <a:lvl3pPr marL="1162050" indent="-358775" defTabSz="371475" eaLnBrk="1" hangingPunct="1">
+              <a:lnSpc>
+                <a:spcPct val="120000"/>
+              </a:lnSpc>
+              <a:spcBef>
+                <a:spcPts val="700"/>
+              </a:spcBef>
+              <a:buClr>
+                <a:schemeClr val="tx1"/>
+              </a:buClr>
+              <a:buSzPct val="130000"/>
+              <a:buFontTx/>
+              <a:buChar char="•"/>
+              <a:defRPr sz="2400">
+                <a:uFill>
+                  <a:solidFill/>
+                </a:uFill>
+                <a:latin typeface="+mn-lt"/>
+                <a:ea typeface="+mn-ea"/>
+                <a:cs typeface="+mn-cs"/>
+                <a:sym typeface="Helvetica Neue"/>
+              </a:defRPr>
+            </a:lvl3pPr>
+            <a:lvl4pPr marL="1433513" indent="-252413" defTabSz="361950" eaLnBrk="1" hangingPunct="1">
+              <a:lnSpc>
+                <a:spcPct val="120000"/>
+              </a:lnSpc>
+              <a:spcBef>
+                <a:spcPts val="700"/>
+              </a:spcBef>
+              <a:buClr>
+                <a:schemeClr val="tx1"/>
+              </a:buClr>
+              <a:buSzPct val="130000"/>
+              <a:buFontTx/>
+              <a:buChar char="•"/>
+              <a:defRPr sz="2000">
+                <a:uFill>
+                  <a:solidFill/>
+                </a:uFill>
+                <a:latin typeface="+mn-lt"/>
+                <a:ea typeface="+mn-ea"/>
+                <a:cs typeface="+mn-cs"/>
+                <a:sym typeface="Helvetica Neue"/>
+              </a:defRPr>
+            </a:lvl4pPr>
+            <a:lvl5pPr marL="1704975" indent="-180975" defTabSz="358775" eaLnBrk="1" hangingPunct="1">
+              <a:lnSpc>
+                <a:spcPct val="120000"/>
+              </a:lnSpc>
+              <a:spcBef>
+                <a:spcPts val="700"/>
+              </a:spcBef>
+              <a:buClr>
+                <a:schemeClr val="tx1"/>
+              </a:buClr>
+              <a:buSzPct val="130000"/>
+              <a:buFontTx/>
+              <a:buChar char="•"/>
+              <a:defRPr sz="1800">
+                <a:uFill>
+                  <a:solidFill/>
+                </a:uFill>
+                <a:latin typeface="+mn-lt"/>
+                <a:ea typeface="+mn-ea"/>
+                <a:cs typeface="+mn-cs"/>
+                <a:sym typeface="Helvetica Neue"/>
+              </a:defRPr>
+            </a:lvl5pPr>
+            <a:lvl6pPr marL="2990850" indent="-539750" defTabSz="1295400" eaLnBrk="1" hangingPunct="1">
+              <a:spcBef>
+                <a:spcPts val="700"/>
+              </a:spcBef>
+              <a:buClr>
+                <a:srgbClr val="64AD65"/>
+              </a:buClr>
+              <a:buSzPct val="171000"/>
+              <a:buFont typeface="Wingdings"/>
+              <a:buChar char="•"/>
+              <a:defRPr sz="3400">
+                <a:uFill>
+                  <a:solidFill/>
+                </a:uFill>
+                <a:latin typeface="+mn-lt"/>
+                <a:ea typeface="+mn-ea"/>
+                <a:cs typeface="+mn-cs"/>
+                <a:sym typeface="Helvetica Neue"/>
+              </a:defRPr>
+            </a:lvl6pPr>
+            <a:lvl7pPr marL="3346450" indent="-539750" defTabSz="1295400" eaLnBrk="1" hangingPunct="1">
+              <a:spcBef>
+                <a:spcPts val="700"/>
+              </a:spcBef>
+              <a:buClr>
+                <a:srgbClr val="64AD65"/>
+              </a:buClr>
+              <a:buSzPct val="171000"/>
+              <a:buFont typeface="Wingdings"/>
+              <a:buChar char="•"/>
+              <a:defRPr sz="3400">
+                <a:uFill>
+                  <a:solidFill/>
+                </a:uFill>
+                <a:latin typeface="+mn-lt"/>
+                <a:ea typeface="+mn-ea"/>
+                <a:cs typeface="+mn-cs"/>
+                <a:sym typeface="Helvetica Neue"/>
+              </a:defRPr>
+            </a:lvl7pPr>
+            <a:lvl8pPr marL="3702050" indent="-539750" defTabSz="1295400" eaLnBrk="1" hangingPunct="1">
+              <a:spcBef>
+                <a:spcPts val="700"/>
+              </a:spcBef>
+              <a:buClr>
+                <a:srgbClr val="64AD65"/>
+              </a:buClr>
+              <a:buSzPct val="171000"/>
+              <a:buFont typeface="Wingdings"/>
+              <a:buChar char="•"/>
+              <a:defRPr sz="3400">
+                <a:uFill>
+                  <a:solidFill/>
+                </a:uFill>
+                <a:latin typeface="+mn-lt"/>
+                <a:ea typeface="+mn-ea"/>
+                <a:cs typeface="+mn-cs"/>
+                <a:sym typeface="Helvetica Neue"/>
+              </a:defRPr>
+            </a:lvl8pPr>
+            <a:lvl9pPr marL="4057650" indent="-539750" defTabSz="1295400" eaLnBrk="1" hangingPunct="1">
+              <a:spcBef>
+                <a:spcPts val="700"/>
+              </a:spcBef>
+              <a:buClr>
+                <a:srgbClr val="64AD65"/>
+              </a:buClr>
+              <a:buSzPct val="171000"/>
+              <a:buFont typeface="Wingdings"/>
+              <a:buChar char="•"/>
+              <a:defRPr sz="3400">
+                <a:uFill>
+                  <a:solidFill/>
+                </a:uFill>
+                <a:latin typeface="+mn-lt"/>
+                <a:ea typeface="+mn-ea"/>
+                <a:cs typeface="+mn-cs"/>
+                <a:sym typeface="Helvetica Neue"/>
+              </a:defRPr>
+            </a:lvl9pPr>
+          </a:lstStyle>
+          <a:p>
+            <a:r>
+              <a:rPr lang="en-US" sz="2600" dirty="0" smtClean="0"/>
+              <a:t>Sources on GitHub</a:t>
+            </a:r>
+          </a:p>
+          <a:p>
+            <a:pPr marL="0" indent="0">
+              <a:buFontTx/>
+              <a:buNone/>
+            </a:pPr>
+            <a:r>
+              <a:rPr lang="en-US" sz="2600" u="sng" dirty="0" smtClean="0">
+                <a:hlinkClick r:id="rId4"/>
+              </a:rPr>
+              <a:t>https://github.com/mami-project/pto-web</a:t>
+            </a:r>
+            <a:endParaRPr lang="en-US" sz="2600" dirty="0"/>
+          </a:p>
+        </p:txBody>
+      </p:sp>
+      <p:pic>
+        <p:nvPicPr>
+          <p:cNvPr id="8" name="Picture 7"/>
+          <p:cNvPicPr>
+            <a:picLocks noChangeAspect="1"/>
+          </p:cNvPicPr>
+          <p:nvPr/>
+        </p:nvPicPr>
+        <p:blipFill>
+          <a:blip r:embed="rId5"/>
+          <a:stretch>
+            <a:fillRect/>
+          </a:stretch>
+        </p:blipFill>
+        <p:spPr>
+          <a:xfrm>
+            <a:off x="10140756" y="3986953"/>
+            <a:ext cx="2868259" cy="2206966"/>
+          </a:xfrm>
+          <a:prstGeom prst="rect">
+            <a:avLst/>
+          </a:prstGeom>
+        </p:spPr>
+      </p:pic>
+      <p:pic>
+        <p:nvPicPr>
+          <p:cNvPr id="9" name="Picture 8"/>
+          <p:cNvPicPr>
+            <a:picLocks noChangeAspect="1"/>
+          </p:cNvPicPr>
+          <p:nvPr/>
+        </p:nvPicPr>
+        <p:blipFill>
+          <a:blip r:embed="rId6"/>
+          <a:stretch>
+            <a:fillRect/>
+          </a:stretch>
+        </p:blipFill>
+        <p:spPr>
+          <a:xfrm>
+            <a:off x="6835187" y="6056595"/>
+            <a:ext cx="3466356" cy="2241577"/>
+          </a:xfrm>
+          <a:prstGeom prst="rect">
+            <a:avLst/>
+          </a:prstGeom>
+        </p:spPr>
+      </p:pic>
+      <p:pic>
+        <p:nvPicPr>
+          <p:cNvPr id="10" name="Picture 9"/>
+          <p:cNvPicPr>
+            <a:picLocks noChangeAspect="1"/>
+          </p:cNvPicPr>
+          <p:nvPr/>
+        </p:nvPicPr>
+        <p:blipFill>
+          <a:blip r:embed="rId7"/>
+          <a:stretch>
+            <a:fillRect/>
+          </a:stretch>
+        </p:blipFill>
+        <p:spPr>
+          <a:xfrm>
+            <a:off x="9903699" y="6260402"/>
+            <a:ext cx="3101101" cy="2948310"/>
+          </a:xfrm>
+          <a:prstGeom prst="rect">
+            <a:avLst/>
+          </a:prstGeom>
+        </p:spPr>
+      </p:pic>
+    </p:spTree>
+    <p:extLst>
+      <p:ext uri="{BB962C8B-B14F-4D97-AF65-F5344CB8AC3E}">
+        <p14:creationId xmlns:p14="http://schemas.microsoft.com/office/powerpoint/2010/main" val="1651468116"/>
       </p:ext>
     </p:extLst>
   </p:cSld>
@@ -9309,15 +9955,7 @@
             <a:pPr lvl="1"/>
             <a:r>
               <a:rPr lang="en-GB" dirty="0" smtClean="0"/>
-              <a:t>Journals, magazines, conferences, and </a:t>
-            </a:r>
-            <a:r>
-              <a:rPr lang="en-GB" dirty="0" smtClean="0"/>
-              <a:t>workshops as well as operator </a:t>
-            </a:r>
-            <a:r>
-              <a:rPr lang="en-GB" dirty="0" smtClean="0"/>
-              <a:t>conferences</a:t>
+              <a:t>Journals, magazines, conferences, and workshops as well as operator conferences</a:t>
             </a:r>
           </a:p>
           <a:p>
@@ -9330,27 +9968,14 @@
             <a:pPr lvl="1"/>
             <a:r>
               <a:rPr lang="en-GB" dirty="0" smtClean="0"/>
-              <a:t>Identify and collaborate with other organisations, key market players and potential </a:t>
-            </a:r>
-            <a:r>
-              <a:rPr lang="en-GB" dirty="0" smtClean="0"/>
-              <a:t>users</a:t>
-            </a:r>
-            <a:endParaRPr lang="en-GB" dirty="0" smtClean="0"/>
+              <a:t>Identify and collaborate with other organisations, key market players and potential users</a:t>
+            </a:r>
           </a:p>
           <a:p>
             <a:pPr lvl="1"/>
             <a:r>
               <a:rPr lang="en-GB" dirty="0" smtClean="0"/>
-              <a:t>Identify key application(s) of the project </a:t>
-            </a:r>
-            <a:r>
-              <a:rPr lang="en-GB" dirty="0" smtClean="0"/>
-              <a:t>results and define </a:t>
-            </a:r>
-            <a:r>
-              <a:rPr lang="en-GB" dirty="0" smtClean="0"/>
-              <a:t>the maturity of the technology</a:t>
+              <a:t>Identify key application(s) of the project results and define the maturity of the technology</a:t>
             </a:r>
           </a:p>
           <a:p>
@@ -9744,7 +10369,6 @@
               <a:rPr lang="en-GB" dirty="0" smtClean="0"/>
               <a:t> Program</a:t>
             </a:r>
-            <a:endParaRPr lang="en-GB" dirty="0" smtClean="0"/>
           </a:p>
           <a:p>
             <a:r>
@@ -10193,7 +10817,7 @@
         <p:spPr/>
         <p:txBody>
           <a:bodyPr>
-            <a:normAutofit fontScale="92500"/>
+            <a:normAutofit lnSpcReduction="10000"/>
           </a:bodyPr>
           <a:lstStyle/>
           <a:p>

</xml_diff>